<commit_message>
added mansCurveFit system block diagrams
</commit_message>
<xml_diff>
--- a/Documentation/manosCurveFit/manosCurveFit_flowchart.pptx
+++ b/Documentation/manosCurveFit/manosCurveFit_flowchart.pptx
@@ -288,7 +288,7 @@
           <a:p>
             <a:fld id="{1DF902C2-BBD0-4792-9906-0230D7FA28BF}" type="datetimeFigureOut">
               <a:rPr lang="en-US" smtClean="0"/>
-              <a:t>1/13/2014</a:t>
+              <a:t>1/14/2014</a:t>
             </a:fld>
             <a:endParaRPr lang="en-US"/>
           </a:p>
@@ -458,7 +458,7 @@
           <a:p>
             <a:fld id="{1DF902C2-BBD0-4792-9906-0230D7FA28BF}" type="datetimeFigureOut">
               <a:rPr lang="en-US" smtClean="0"/>
-              <a:t>1/13/2014</a:t>
+              <a:t>1/14/2014</a:t>
             </a:fld>
             <a:endParaRPr lang="en-US"/>
           </a:p>
@@ -638,7 +638,7 @@
           <a:p>
             <a:fld id="{1DF902C2-BBD0-4792-9906-0230D7FA28BF}" type="datetimeFigureOut">
               <a:rPr lang="en-US" smtClean="0"/>
-              <a:t>1/13/2014</a:t>
+              <a:t>1/14/2014</a:t>
             </a:fld>
             <a:endParaRPr lang="en-US"/>
           </a:p>
@@ -808,7 +808,7 @@
           <a:p>
             <a:fld id="{1DF902C2-BBD0-4792-9906-0230D7FA28BF}" type="datetimeFigureOut">
               <a:rPr lang="en-US" smtClean="0"/>
-              <a:t>1/13/2014</a:t>
+              <a:t>1/14/2014</a:t>
             </a:fld>
             <a:endParaRPr lang="en-US"/>
           </a:p>
@@ -1054,7 +1054,7 @@
           <a:p>
             <a:fld id="{1DF902C2-BBD0-4792-9906-0230D7FA28BF}" type="datetimeFigureOut">
               <a:rPr lang="en-US" smtClean="0"/>
-              <a:t>1/13/2014</a:t>
+              <a:t>1/14/2014</a:t>
             </a:fld>
             <a:endParaRPr lang="en-US"/>
           </a:p>
@@ -1342,7 +1342,7 @@
           <a:p>
             <a:fld id="{1DF902C2-BBD0-4792-9906-0230D7FA28BF}" type="datetimeFigureOut">
               <a:rPr lang="en-US" smtClean="0"/>
-              <a:t>1/13/2014</a:t>
+              <a:t>1/14/2014</a:t>
             </a:fld>
             <a:endParaRPr lang="en-US"/>
           </a:p>
@@ -1764,7 +1764,7 @@
           <a:p>
             <a:fld id="{1DF902C2-BBD0-4792-9906-0230D7FA28BF}" type="datetimeFigureOut">
               <a:rPr lang="en-US" smtClean="0"/>
-              <a:t>1/13/2014</a:t>
+              <a:t>1/14/2014</a:t>
             </a:fld>
             <a:endParaRPr lang="en-US"/>
           </a:p>
@@ -1882,7 +1882,7 @@
           <a:p>
             <a:fld id="{1DF902C2-BBD0-4792-9906-0230D7FA28BF}" type="datetimeFigureOut">
               <a:rPr lang="en-US" smtClean="0"/>
-              <a:t>1/13/2014</a:t>
+              <a:t>1/14/2014</a:t>
             </a:fld>
             <a:endParaRPr lang="en-US"/>
           </a:p>
@@ -1977,7 +1977,7 @@
           <a:p>
             <a:fld id="{1DF902C2-BBD0-4792-9906-0230D7FA28BF}" type="datetimeFigureOut">
               <a:rPr lang="en-US" smtClean="0"/>
-              <a:t>1/13/2014</a:t>
+              <a:t>1/14/2014</a:t>
             </a:fld>
             <a:endParaRPr lang="en-US"/>
           </a:p>
@@ -2254,7 +2254,7 @@
           <a:p>
             <a:fld id="{1DF902C2-BBD0-4792-9906-0230D7FA28BF}" type="datetimeFigureOut">
               <a:rPr lang="en-US" smtClean="0"/>
-              <a:t>1/13/2014</a:t>
+              <a:t>1/14/2014</a:t>
             </a:fld>
             <a:endParaRPr lang="en-US"/>
           </a:p>
@@ -2507,7 +2507,7 @@
           <a:p>
             <a:fld id="{1DF902C2-BBD0-4792-9906-0230D7FA28BF}" type="datetimeFigureOut">
               <a:rPr lang="en-US" smtClean="0"/>
-              <a:t>1/13/2014</a:t>
+              <a:t>1/14/2014</a:t>
             </a:fld>
             <a:endParaRPr lang="en-US"/>
           </a:p>
@@ -2720,7 +2720,7 @@
           <a:p>
             <a:fld id="{1DF902C2-BBD0-4792-9906-0230D7FA28BF}" type="datetimeFigureOut">
               <a:rPr lang="en-US" smtClean="0"/>
-              <a:t>1/13/2014</a:t>
+              <a:t>1/14/2014</a:t>
             </a:fld>
             <a:endParaRPr lang="en-US"/>
           </a:p>
@@ -3220,10 +3220,10 @@
           <a:p>
             <a:pPr algn="ctr"/>
             <a:r>
-              <a:rPr lang="en-US" sz="1600" dirty="0" smtClean="0"/>
-              <a:t>Initial Guess at Period</a:t>
-            </a:r>
-            <a:endParaRPr lang="en-US" sz="1600" dirty="0"/>
+              <a:rPr lang="en-US" sz="1500" dirty="0" smtClean="0"/>
+              <a:t>(Period Guess)</a:t>
+            </a:r>
+            <a:endParaRPr lang="en-US" sz="1500" dirty="0"/>
           </a:p>
         </p:txBody>
       </p:sp>
@@ -3764,6 +3764,183 @@
           </a:fontRef>
         </p:style>
       </p:cxnSp>
+      <p:sp>
+        <p:nvSpPr>
+          <p:cNvPr id="2" name="Rounded Rectangle 1"/>
+          <p:cNvSpPr/>
+          <p:nvPr/>
+        </p:nvSpPr>
+        <p:spPr>
+          <a:xfrm>
+            <a:off x="2286000" y="1066800"/>
+            <a:ext cx="5105400" cy="3810000"/>
+          </a:xfrm>
+          <a:prstGeom prst="roundRect">
+            <a:avLst/>
+          </a:prstGeom>
+          <a:noFill/>
+          <a:ln>
+            <a:prstDash val="dash"/>
+          </a:ln>
+        </p:spPr>
+        <p:style>
+          <a:lnRef idx="2">
+            <a:schemeClr val="accent6"/>
+          </a:lnRef>
+          <a:fillRef idx="1">
+            <a:schemeClr val="lt1"/>
+          </a:fillRef>
+          <a:effectRef idx="0">
+            <a:schemeClr val="accent6"/>
+          </a:effectRef>
+          <a:fontRef idx="minor">
+            <a:schemeClr val="dk1"/>
+          </a:fontRef>
+        </p:style>
+        <p:txBody>
+          <a:bodyPr rtlCol="0" anchor="ctr"/>
+          <a:lstStyle/>
+          <a:p>
+            <a:pPr algn="ctr"/>
+            <a:endParaRPr lang="en-US"/>
+          </a:p>
+        </p:txBody>
+      </p:sp>
+      <p:sp>
+        <p:nvSpPr>
+          <p:cNvPr id="20" name="Rounded Rectangle 19"/>
+          <p:cNvSpPr/>
+          <p:nvPr/>
+        </p:nvSpPr>
+        <p:spPr>
+          <a:xfrm>
+            <a:off x="4495799" y="5130801"/>
+            <a:ext cx="1752601" cy="1269999"/>
+          </a:xfrm>
+          <a:prstGeom prst="roundRect">
+            <a:avLst/>
+          </a:prstGeom>
+          <a:noFill/>
+          <a:ln>
+            <a:prstDash val="dash"/>
+          </a:ln>
+        </p:spPr>
+        <p:style>
+          <a:lnRef idx="2">
+            <a:schemeClr val="accent6"/>
+          </a:lnRef>
+          <a:fillRef idx="1">
+            <a:schemeClr val="lt1"/>
+          </a:fillRef>
+          <a:effectRef idx="0">
+            <a:schemeClr val="accent6"/>
+          </a:effectRef>
+          <a:fontRef idx="minor">
+            <a:schemeClr val="dk1"/>
+          </a:fontRef>
+        </p:style>
+        <p:txBody>
+          <a:bodyPr rtlCol="0" anchor="ctr"/>
+          <a:lstStyle/>
+          <a:p>
+            <a:pPr algn="ctr"/>
+            <a:endParaRPr lang="en-US"/>
+          </a:p>
+        </p:txBody>
+      </p:sp>
+      <p:sp>
+        <p:nvSpPr>
+          <p:cNvPr id="3" name="TextBox 2"/>
+          <p:cNvSpPr txBox="1"/>
+          <p:nvPr/>
+        </p:nvSpPr>
+        <p:spPr>
+          <a:xfrm>
+            <a:off x="457200" y="685800"/>
+            <a:ext cx="1447800" cy="369332"/>
+          </a:xfrm>
+          <a:prstGeom prst="rect">
+            <a:avLst/>
+          </a:prstGeom>
+          <a:noFill/>
+        </p:spPr>
+        <p:txBody>
+          <a:bodyPr wrap="square" rtlCol="0">
+            <a:spAutoFit/>
+          </a:bodyPr>
+          <a:lstStyle/>
+          <a:p>
+            <a:pPr algn="ctr"/>
+            <a:r>
+              <a:rPr lang="en-US" b="1" dirty="0" smtClean="0"/>
+              <a:t>Input</a:t>
+            </a:r>
+            <a:endParaRPr lang="en-US" b="1" dirty="0"/>
+          </a:p>
+        </p:txBody>
+      </p:sp>
+      <p:sp>
+        <p:nvSpPr>
+          <p:cNvPr id="23" name="TextBox 22"/>
+          <p:cNvSpPr txBox="1"/>
+          <p:nvPr/>
+        </p:nvSpPr>
+        <p:spPr>
+          <a:xfrm>
+            <a:off x="4102100" y="653534"/>
+            <a:ext cx="1447800" cy="369332"/>
+          </a:xfrm>
+          <a:prstGeom prst="rect">
+            <a:avLst/>
+          </a:prstGeom>
+          <a:noFill/>
+        </p:spPr>
+        <p:txBody>
+          <a:bodyPr wrap="square" rtlCol="0">
+            <a:spAutoFit/>
+          </a:bodyPr>
+          <a:lstStyle/>
+          <a:p>
+            <a:pPr algn="ctr"/>
+            <a:r>
+              <a:rPr lang="en-US" b="1" dirty="0" smtClean="0"/>
+              <a:t>Evaluation</a:t>
+            </a:r>
+            <a:endParaRPr lang="en-US" b="1" dirty="0"/>
+          </a:p>
+        </p:txBody>
+      </p:sp>
+      <p:sp>
+        <p:nvSpPr>
+          <p:cNvPr id="24" name="TextBox 23"/>
+          <p:cNvSpPr txBox="1"/>
+          <p:nvPr/>
+        </p:nvSpPr>
+        <p:spPr>
+          <a:xfrm>
+            <a:off x="4660900" y="6439932"/>
+            <a:ext cx="1447800" cy="369332"/>
+          </a:xfrm>
+          <a:prstGeom prst="rect">
+            <a:avLst/>
+          </a:prstGeom>
+          <a:noFill/>
+        </p:spPr>
+        <p:txBody>
+          <a:bodyPr wrap="square" rtlCol="0">
+            <a:spAutoFit/>
+          </a:bodyPr>
+          <a:lstStyle/>
+          <a:p>
+            <a:pPr algn="ctr"/>
+            <a:r>
+              <a:rPr lang="en-US" b="1" dirty="0" smtClean="0"/>
+              <a:t>Output</a:t>
+            </a:r>
+            <a:endParaRPr lang="en-US" b="1" dirty="0"/>
+          </a:p>
+        </p:txBody>
+      </p:sp>
     </p:spTree>
     <p:extLst>
       <p:ext uri="{BB962C8B-B14F-4D97-AF65-F5344CB8AC3E}">

</xml_diff>

<commit_message>
added a file structure diagram to the documentation a
</commit_message>
<xml_diff>
--- a/Documentation/manosCurveFit/manosCurveFit_flowchart.pptx
+++ b/Documentation/manosCurveFit/manosCurveFit_flowchart.pptx
@@ -6,6 +6,7 @@
   </p:sldMasterIdLst>
   <p:sldIdLst>
     <p:sldId id="256" r:id="rId2"/>
+    <p:sldId id="257" r:id="rId3"/>
   </p:sldIdLst>
   <p:sldSz cx="9144000" cy="6858000" type="screen4x3"/>
   <p:notesSz cx="6858000" cy="9144000"/>
@@ -288,7 +289,7 @@
           <a:p>
             <a:fld id="{1DF902C2-BBD0-4792-9906-0230D7FA28BF}" type="datetimeFigureOut">
               <a:rPr lang="en-US" smtClean="0"/>
-              <a:t>1/14/2014</a:t>
+              <a:t>1/23/2014</a:t>
             </a:fld>
             <a:endParaRPr lang="en-US"/>
           </a:p>
@@ -458,7 +459,7 @@
           <a:p>
             <a:fld id="{1DF902C2-BBD0-4792-9906-0230D7FA28BF}" type="datetimeFigureOut">
               <a:rPr lang="en-US" smtClean="0"/>
-              <a:t>1/14/2014</a:t>
+              <a:t>1/23/2014</a:t>
             </a:fld>
             <a:endParaRPr lang="en-US"/>
           </a:p>
@@ -638,7 +639,7 @@
           <a:p>
             <a:fld id="{1DF902C2-BBD0-4792-9906-0230D7FA28BF}" type="datetimeFigureOut">
               <a:rPr lang="en-US" smtClean="0"/>
-              <a:t>1/14/2014</a:t>
+              <a:t>1/23/2014</a:t>
             </a:fld>
             <a:endParaRPr lang="en-US"/>
           </a:p>
@@ -808,7 +809,7 @@
           <a:p>
             <a:fld id="{1DF902C2-BBD0-4792-9906-0230D7FA28BF}" type="datetimeFigureOut">
               <a:rPr lang="en-US" smtClean="0"/>
-              <a:t>1/14/2014</a:t>
+              <a:t>1/23/2014</a:t>
             </a:fld>
             <a:endParaRPr lang="en-US"/>
           </a:p>
@@ -1054,7 +1055,7 @@
           <a:p>
             <a:fld id="{1DF902C2-BBD0-4792-9906-0230D7FA28BF}" type="datetimeFigureOut">
               <a:rPr lang="en-US" smtClean="0"/>
-              <a:t>1/14/2014</a:t>
+              <a:t>1/23/2014</a:t>
             </a:fld>
             <a:endParaRPr lang="en-US"/>
           </a:p>
@@ -1342,7 +1343,7 @@
           <a:p>
             <a:fld id="{1DF902C2-BBD0-4792-9906-0230D7FA28BF}" type="datetimeFigureOut">
               <a:rPr lang="en-US" smtClean="0"/>
-              <a:t>1/14/2014</a:t>
+              <a:t>1/23/2014</a:t>
             </a:fld>
             <a:endParaRPr lang="en-US"/>
           </a:p>
@@ -1764,7 +1765,7 @@
           <a:p>
             <a:fld id="{1DF902C2-BBD0-4792-9906-0230D7FA28BF}" type="datetimeFigureOut">
               <a:rPr lang="en-US" smtClean="0"/>
-              <a:t>1/14/2014</a:t>
+              <a:t>1/23/2014</a:t>
             </a:fld>
             <a:endParaRPr lang="en-US"/>
           </a:p>
@@ -1882,7 +1883,7 @@
           <a:p>
             <a:fld id="{1DF902C2-BBD0-4792-9906-0230D7FA28BF}" type="datetimeFigureOut">
               <a:rPr lang="en-US" smtClean="0"/>
-              <a:t>1/14/2014</a:t>
+              <a:t>1/23/2014</a:t>
             </a:fld>
             <a:endParaRPr lang="en-US"/>
           </a:p>
@@ -1977,7 +1978,7 @@
           <a:p>
             <a:fld id="{1DF902C2-BBD0-4792-9906-0230D7FA28BF}" type="datetimeFigureOut">
               <a:rPr lang="en-US" smtClean="0"/>
-              <a:t>1/14/2014</a:t>
+              <a:t>1/23/2014</a:t>
             </a:fld>
             <a:endParaRPr lang="en-US"/>
           </a:p>
@@ -2254,7 +2255,7 @@
           <a:p>
             <a:fld id="{1DF902C2-BBD0-4792-9906-0230D7FA28BF}" type="datetimeFigureOut">
               <a:rPr lang="en-US" smtClean="0"/>
-              <a:t>1/14/2014</a:t>
+              <a:t>1/23/2014</a:t>
             </a:fld>
             <a:endParaRPr lang="en-US"/>
           </a:p>
@@ -2507,7 +2508,7 @@
           <a:p>
             <a:fld id="{1DF902C2-BBD0-4792-9906-0230D7FA28BF}" type="datetimeFigureOut">
               <a:rPr lang="en-US" smtClean="0"/>
-              <a:t>1/14/2014</a:t>
+              <a:t>1/23/2014</a:t>
             </a:fld>
             <a:endParaRPr lang="en-US"/>
           </a:p>
@@ -2720,7 +2721,7 @@
           <a:p>
             <a:fld id="{1DF902C2-BBD0-4792-9906-0230D7FA28BF}" type="datetimeFigureOut">
               <a:rPr lang="en-US" smtClean="0"/>
-              <a:t>1/14/2014</a:t>
+              <a:t>1/23/2014</a:t>
             </a:fld>
             <a:endParaRPr lang="en-US"/>
           </a:p>
@@ -3945,6 +3946,688 @@
     <p:extLst>
       <p:ext uri="{BB962C8B-B14F-4D97-AF65-F5344CB8AC3E}">
         <p14:creationId xmlns:p14="http://schemas.microsoft.com/office/powerpoint/2010/main" val="576735624"/>
+      </p:ext>
+    </p:extLst>
+  </p:cSld>
+  <p:clrMapOvr>
+    <a:masterClrMapping/>
+  </p:clrMapOvr>
+</p:sld>
+</file>
+
+<file path=ppt/slides/slide2.xml><?xml version="1.0" encoding="utf-8"?>
+<p:sld xmlns:a="http://schemas.openxmlformats.org/drawingml/2006/main" xmlns:r="http://schemas.openxmlformats.org/officeDocument/2006/relationships" xmlns:p="http://schemas.openxmlformats.org/presentationml/2006/main">
+  <p:cSld>
+    <p:spTree>
+      <p:nvGrpSpPr>
+        <p:cNvPr id="1" name=""/>
+        <p:cNvGrpSpPr/>
+        <p:nvPr/>
+      </p:nvGrpSpPr>
+      <p:grpSpPr>
+        <a:xfrm>
+          <a:off x="0" y="0"/>
+          <a:ext cx="0" cy="0"/>
+          <a:chOff x="0" y="0"/>
+          <a:chExt cx="0" cy="0"/>
+        </a:xfrm>
+      </p:grpSpPr>
+      <p:sp>
+        <p:nvSpPr>
+          <p:cNvPr id="4" name="Flowchart: Multidocument 3"/>
+          <p:cNvSpPr/>
+          <p:nvPr/>
+        </p:nvSpPr>
+        <p:spPr>
+          <a:xfrm>
+            <a:off x="3810000" y="4343400"/>
+            <a:ext cx="1054978" cy="754855"/>
+          </a:xfrm>
+          <a:prstGeom prst="flowChartMultidocument">
+            <a:avLst/>
+          </a:prstGeom>
+        </p:spPr>
+        <p:style>
+          <a:lnRef idx="2">
+            <a:schemeClr val="dk1"/>
+          </a:lnRef>
+          <a:fillRef idx="1">
+            <a:schemeClr val="lt1"/>
+          </a:fillRef>
+          <a:effectRef idx="0">
+            <a:schemeClr val="dk1"/>
+          </a:effectRef>
+          <a:fontRef idx="minor">
+            <a:schemeClr val="dk1"/>
+          </a:fontRef>
+        </p:style>
+        <p:txBody>
+          <a:bodyPr rtlCol="0" anchor="ctr"/>
+          <a:lstStyle/>
+          <a:p>
+            <a:pPr algn="ctr"/>
+            <a:r>
+              <a:rPr lang="en-US" sz="1000" dirty="0" smtClean="0"/>
+              <a:t>Object1Data_standard.txt</a:t>
+            </a:r>
+            <a:endParaRPr lang="en-US" sz="1000" dirty="0"/>
+          </a:p>
+        </p:txBody>
+      </p:sp>
+      <p:pic>
+        <p:nvPicPr>
+          <p:cNvPr id="1032" name="Picture 8" descr="http://www.graphicsfuel.com/wp-content/uploads/2012/03/folder-icon-512x512.png"/>
+          <p:cNvPicPr>
+            <a:picLocks noChangeAspect="1" noChangeArrowheads="1"/>
+          </p:cNvPicPr>
+          <p:nvPr/>
+        </p:nvPicPr>
+        <p:blipFill>
+          <a:blip r:embed="rId2" cstate="print">
+            <a:extLst>
+              <a:ext uri="{28A0092B-C50C-407E-A947-70E740481C1C}">
+                <a14:useLocalDpi xmlns:a14="http://schemas.microsoft.com/office/drawing/2010/main" val="0"/>
+              </a:ext>
+            </a:extLst>
+          </a:blip>
+          <a:srcRect/>
+          <a:stretch>
+            <a:fillRect/>
+          </a:stretch>
+        </p:blipFill>
+        <p:spPr bwMode="auto">
+          <a:xfrm>
+            <a:off x="1223960" y="1447801"/>
+            <a:ext cx="1295401" cy="1295402"/>
+          </a:xfrm>
+          <a:prstGeom prst="rect">
+            <a:avLst/>
+          </a:prstGeom>
+          <a:noFill/>
+          <a:extLst>
+            <a:ext uri="{909E8E84-426E-40DD-AFC4-6F175D3DCCD1}">
+              <a14:hiddenFill xmlns:a14="http://schemas.microsoft.com/office/drawing/2010/main">
+                <a:solidFill>
+                  <a:srgbClr val="FFFFFF"/>
+                </a:solidFill>
+              </a14:hiddenFill>
+            </a:ext>
+          </a:extLst>
+        </p:spPr>
+      </p:pic>
+      <p:pic>
+        <p:nvPicPr>
+          <p:cNvPr id="1039" name="Picture 15"/>
+          <p:cNvPicPr>
+            <a:picLocks noChangeAspect="1" noChangeArrowheads="1"/>
+          </p:cNvPicPr>
+          <p:nvPr/>
+        </p:nvPicPr>
+        <p:blipFill>
+          <a:blip r:embed="rId3">
+            <a:extLst>
+              <a:ext uri="{28A0092B-C50C-407E-A947-70E740481C1C}">
+                <a14:useLocalDpi xmlns:a14="http://schemas.microsoft.com/office/drawing/2010/main" val="0"/>
+              </a:ext>
+            </a:extLst>
+          </a:blip>
+          <a:srcRect/>
+          <a:stretch>
+            <a:fillRect/>
+          </a:stretch>
+        </p:blipFill>
+        <p:spPr bwMode="auto">
+          <a:xfrm>
+            <a:off x="1348578" y="2743200"/>
+            <a:ext cx="1071563" cy="1071563"/>
+          </a:xfrm>
+          <a:prstGeom prst="rect">
+            <a:avLst/>
+          </a:prstGeom>
+          <a:noFill/>
+          <a:ln>
+            <a:noFill/>
+          </a:ln>
+          <a:extLst>
+            <a:ext uri="{909E8E84-426E-40DD-AFC4-6F175D3DCCD1}">
+              <a14:hiddenFill xmlns:a14="http://schemas.microsoft.com/office/drawing/2010/main">
+                <a:solidFill>
+                  <a:schemeClr val="accent1"/>
+                </a:solidFill>
+              </a14:hiddenFill>
+            </a:ext>
+            <a:ext uri="{91240B29-F687-4F45-9708-019B960494DF}">
+              <a14:hiddenLine xmlns:a14="http://schemas.microsoft.com/office/drawing/2010/main" w="9525">
+                <a:solidFill>
+                  <a:schemeClr val="tx1"/>
+                </a:solidFill>
+                <a:miter lim="800000"/>
+                <a:headEnd/>
+                <a:tailEnd/>
+              </a14:hiddenLine>
+            </a:ext>
+          </a:extLst>
+        </p:spPr>
+      </p:pic>
+      <p:pic>
+        <p:nvPicPr>
+          <p:cNvPr id="13" name="Picture 8" descr="http://www.graphicsfuel.com/wp-content/uploads/2012/03/folder-icon-512x512.png"/>
+          <p:cNvPicPr>
+            <a:picLocks noChangeAspect="1" noChangeArrowheads="1"/>
+          </p:cNvPicPr>
+          <p:nvPr/>
+        </p:nvPicPr>
+        <p:blipFill>
+          <a:blip r:embed="rId2" cstate="print">
+            <a:extLst>
+              <a:ext uri="{28A0092B-C50C-407E-A947-70E740481C1C}">
+                <a14:useLocalDpi xmlns:a14="http://schemas.microsoft.com/office/drawing/2010/main" val="0"/>
+              </a:ext>
+            </a:extLst>
+          </a:blip>
+          <a:srcRect/>
+          <a:stretch>
+            <a:fillRect/>
+          </a:stretch>
+        </p:blipFill>
+        <p:spPr bwMode="auto">
+          <a:xfrm>
+            <a:off x="4495799" y="1447801"/>
+            <a:ext cx="1295401" cy="1295402"/>
+          </a:xfrm>
+          <a:prstGeom prst="rect">
+            <a:avLst/>
+          </a:prstGeom>
+          <a:noFill/>
+          <a:extLst>
+            <a:ext uri="{909E8E84-426E-40DD-AFC4-6F175D3DCCD1}">
+              <a14:hiddenFill xmlns:a14="http://schemas.microsoft.com/office/drawing/2010/main">
+                <a:solidFill>
+                  <a:srgbClr val="FFFFFF"/>
+                </a:solidFill>
+              </a14:hiddenFill>
+            </a:ext>
+          </a:extLst>
+        </p:spPr>
+      </p:pic>
+      <p:pic>
+        <p:nvPicPr>
+          <p:cNvPr id="14" name="Picture 8" descr="http://www.graphicsfuel.com/wp-content/uploads/2012/03/folder-icon-512x512.png"/>
+          <p:cNvPicPr>
+            <a:picLocks noChangeAspect="1" noChangeArrowheads="1"/>
+          </p:cNvPicPr>
+          <p:nvPr/>
+        </p:nvPicPr>
+        <p:blipFill>
+          <a:blip r:embed="rId2" cstate="print">
+            <a:extLst>
+              <a:ext uri="{28A0092B-C50C-407E-A947-70E740481C1C}">
+                <a14:useLocalDpi xmlns:a14="http://schemas.microsoft.com/office/drawing/2010/main" val="0"/>
+              </a:ext>
+            </a:extLst>
+          </a:blip>
+          <a:srcRect/>
+          <a:stretch>
+            <a:fillRect/>
+          </a:stretch>
+        </p:blipFill>
+        <p:spPr bwMode="auto">
+          <a:xfrm>
+            <a:off x="3733799" y="2971800"/>
+            <a:ext cx="1295401" cy="1295402"/>
+          </a:xfrm>
+          <a:prstGeom prst="rect">
+            <a:avLst/>
+          </a:prstGeom>
+          <a:noFill/>
+          <a:extLst>
+            <a:ext uri="{909E8E84-426E-40DD-AFC4-6F175D3DCCD1}">
+              <a14:hiddenFill xmlns:a14="http://schemas.microsoft.com/office/drawing/2010/main">
+                <a:solidFill>
+                  <a:srgbClr val="FFFFFF"/>
+                </a:solidFill>
+              </a14:hiddenFill>
+            </a:ext>
+          </a:extLst>
+        </p:spPr>
+      </p:pic>
+      <p:pic>
+        <p:nvPicPr>
+          <p:cNvPr id="15" name="Picture 8" descr="http://www.graphicsfuel.com/wp-content/uploads/2012/03/folder-icon-512x512.png"/>
+          <p:cNvPicPr>
+            <a:picLocks noChangeAspect="1" noChangeArrowheads="1"/>
+          </p:cNvPicPr>
+          <p:nvPr/>
+        </p:nvPicPr>
+        <p:blipFill>
+          <a:blip r:embed="rId2" cstate="print">
+            <a:extLst>
+              <a:ext uri="{28A0092B-C50C-407E-A947-70E740481C1C}">
+                <a14:useLocalDpi xmlns:a14="http://schemas.microsoft.com/office/drawing/2010/main" val="0"/>
+              </a:ext>
+            </a:extLst>
+          </a:blip>
+          <a:srcRect/>
+          <a:stretch>
+            <a:fillRect/>
+          </a:stretch>
+        </p:blipFill>
+        <p:spPr bwMode="auto">
+          <a:xfrm>
+            <a:off x="5334000" y="3005141"/>
+            <a:ext cx="1295401" cy="1295402"/>
+          </a:xfrm>
+          <a:prstGeom prst="rect">
+            <a:avLst/>
+          </a:prstGeom>
+          <a:noFill/>
+          <a:extLst>
+            <a:ext uri="{909E8E84-426E-40DD-AFC4-6F175D3DCCD1}">
+              <a14:hiddenFill xmlns:a14="http://schemas.microsoft.com/office/drawing/2010/main">
+                <a:solidFill>
+                  <a:srgbClr val="FFFFFF"/>
+                </a:solidFill>
+              </a14:hiddenFill>
+            </a:ext>
+          </a:extLst>
+        </p:spPr>
+      </p:pic>
+      <p:sp>
+        <p:nvSpPr>
+          <p:cNvPr id="10" name="Flowchart: Document 9"/>
+          <p:cNvSpPr/>
+          <p:nvPr/>
+        </p:nvSpPr>
+        <p:spPr>
+          <a:xfrm>
+            <a:off x="3810000" y="5326856"/>
+            <a:ext cx="1054978" cy="754855"/>
+          </a:xfrm>
+          <a:prstGeom prst="flowChartDocument">
+            <a:avLst/>
+          </a:prstGeom>
+        </p:spPr>
+        <p:style>
+          <a:lnRef idx="2">
+            <a:schemeClr val="dk1"/>
+          </a:lnRef>
+          <a:fillRef idx="1">
+            <a:schemeClr val="lt1"/>
+          </a:fillRef>
+          <a:effectRef idx="0">
+            <a:schemeClr val="dk1"/>
+          </a:effectRef>
+          <a:fontRef idx="minor">
+            <a:schemeClr val="dk1"/>
+          </a:fontRef>
+        </p:style>
+        <p:txBody>
+          <a:bodyPr rtlCol="0" anchor="ctr"/>
+          <a:lstStyle/>
+          <a:p>
+            <a:pPr algn="ctr"/>
+            <a:r>
+              <a:rPr lang="en-US" dirty="0" smtClean="0"/>
+              <a:t>Object1_fitInfo.txt</a:t>
+            </a:r>
+            <a:endParaRPr lang="en-US" dirty="0"/>
+          </a:p>
+        </p:txBody>
+      </p:sp>
+      <p:sp>
+        <p:nvSpPr>
+          <p:cNvPr id="11" name="TextBox 10"/>
+          <p:cNvSpPr txBox="1"/>
+          <p:nvPr/>
+        </p:nvSpPr>
+        <p:spPr>
+          <a:xfrm>
+            <a:off x="4648200" y="1973263"/>
+            <a:ext cx="990600" cy="381000"/>
+          </a:xfrm>
+          <a:prstGeom prst="rect">
+            <a:avLst/>
+          </a:prstGeom>
+          <a:noFill/>
+        </p:spPr>
+        <p:txBody>
+          <a:bodyPr wrap="square" rtlCol="0">
+            <a:spAutoFit/>
+          </a:bodyPr>
+          <a:lstStyle/>
+          <a:p>
+            <a:pPr algn="ctr"/>
+            <a:r>
+              <a:rPr lang="en-US" b="1" dirty="0" smtClean="0">
+                <a:solidFill>
+                  <a:schemeClr val="bg1"/>
+                </a:solidFill>
+              </a:rPr>
+              <a:t>Data</a:t>
+            </a:r>
+            <a:endParaRPr lang="en-US" b="1" dirty="0">
+              <a:solidFill>
+                <a:schemeClr val="bg1"/>
+              </a:solidFill>
+            </a:endParaRPr>
+          </a:p>
+        </p:txBody>
+      </p:sp>
+      <p:sp>
+        <p:nvSpPr>
+          <p:cNvPr id="19" name="TextBox 18"/>
+          <p:cNvSpPr txBox="1"/>
+          <p:nvPr/>
+        </p:nvSpPr>
+        <p:spPr>
+          <a:xfrm>
+            <a:off x="1376359" y="1985963"/>
+            <a:ext cx="990600" cy="381000"/>
+          </a:xfrm>
+          <a:prstGeom prst="rect">
+            <a:avLst/>
+          </a:prstGeom>
+          <a:noFill/>
+        </p:spPr>
+        <p:txBody>
+          <a:bodyPr wrap="square" rtlCol="0">
+            <a:spAutoFit/>
+          </a:bodyPr>
+          <a:lstStyle/>
+          <a:p>
+            <a:pPr algn="ctr"/>
+            <a:r>
+              <a:rPr lang="en-US" b="1" dirty="0" smtClean="0">
+                <a:solidFill>
+                  <a:schemeClr val="bg1"/>
+                </a:solidFill>
+              </a:rPr>
+              <a:t>Code</a:t>
+            </a:r>
+            <a:endParaRPr lang="en-US" b="1" dirty="0">
+              <a:solidFill>
+                <a:schemeClr val="bg1"/>
+              </a:solidFill>
+            </a:endParaRPr>
+          </a:p>
+        </p:txBody>
+      </p:sp>
+      <p:sp>
+        <p:nvSpPr>
+          <p:cNvPr id="20" name="TextBox 19"/>
+          <p:cNvSpPr txBox="1"/>
+          <p:nvPr/>
+        </p:nvSpPr>
+        <p:spPr>
+          <a:xfrm>
+            <a:off x="688975" y="3817144"/>
+            <a:ext cx="2511425" cy="369332"/>
+          </a:xfrm>
+          <a:prstGeom prst="rect">
+            <a:avLst/>
+          </a:prstGeom>
+          <a:noFill/>
+        </p:spPr>
+        <p:txBody>
+          <a:bodyPr wrap="square" rtlCol="0">
+            <a:spAutoFit/>
+          </a:bodyPr>
+          <a:lstStyle/>
+          <a:p>
+            <a:pPr algn="ctr"/>
+            <a:r>
+              <a:rPr lang="en-US" b="1" dirty="0" smtClean="0"/>
+              <a:t>manosCurveFit.py</a:t>
+            </a:r>
+            <a:endParaRPr lang="en-US" b="1" dirty="0"/>
+          </a:p>
+        </p:txBody>
+      </p:sp>
+      <p:sp>
+        <p:nvSpPr>
+          <p:cNvPr id="21" name="TextBox 20"/>
+          <p:cNvSpPr txBox="1"/>
+          <p:nvPr/>
+        </p:nvSpPr>
+        <p:spPr>
+          <a:xfrm>
+            <a:off x="3886199" y="3462342"/>
+            <a:ext cx="990600" cy="381000"/>
+          </a:xfrm>
+          <a:prstGeom prst="rect">
+            <a:avLst/>
+          </a:prstGeom>
+          <a:noFill/>
+        </p:spPr>
+        <p:txBody>
+          <a:bodyPr wrap="square" rtlCol="0">
+            <a:spAutoFit/>
+          </a:bodyPr>
+          <a:lstStyle/>
+          <a:p>
+            <a:pPr algn="ctr"/>
+            <a:r>
+              <a:rPr lang="en-US" b="1" dirty="0" smtClean="0">
+                <a:solidFill>
+                  <a:schemeClr val="bg1"/>
+                </a:solidFill>
+              </a:rPr>
+              <a:t>Object1</a:t>
+            </a:r>
+            <a:endParaRPr lang="en-US" b="1" dirty="0">
+              <a:solidFill>
+                <a:schemeClr val="bg1"/>
+              </a:solidFill>
+            </a:endParaRPr>
+          </a:p>
+        </p:txBody>
+      </p:sp>
+      <p:sp>
+        <p:nvSpPr>
+          <p:cNvPr id="22" name="TextBox 21"/>
+          <p:cNvSpPr txBox="1"/>
+          <p:nvPr/>
+        </p:nvSpPr>
+        <p:spPr>
+          <a:xfrm>
+            <a:off x="5486400" y="3462342"/>
+            <a:ext cx="990600" cy="369332"/>
+          </a:xfrm>
+          <a:prstGeom prst="rect">
+            <a:avLst/>
+          </a:prstGeom>
+          <a:noFill/>
+        </p:spPr>
+        <p:txBody>
+          <a:bodyPr wrap="square" rtlCol="0">
+            <a:spAutoFit/>
+          </a:bodyPr>
+          <a:lstStyle/>
+          <a:p>
+            <a:pPr algn="ctr"/>
+            <a:r>
+              <a:rPr lang="en-US" b="1" dirty="0" smtClean="0">
+                <a:solidFill>
+                  <a:schemeClr val="bg1"/>
+                </a:solidFill>
+              </a:rPr>
+              <a:t>Object2</a:t>
+            </a:r>
+            <a:endParaRPr lang="en-US" b="1" dirty="0">
+              <a:solidFill>
+                <a:schemeClr val="bg1"/>
+              </a:solidFill>
+            </a:endParaRPr>
+          </a:p>
+        </p:txBody>
+      </p:sp>
+      <p:sp>
+        <p:nvSpPr>
+          <p:cNvPr id="23" name="Flowchart: Multidocument 22"/>
+          <p:cNvSpPr/>
+          <p:nvPr/>
+        </p:nvSpPr>
+        <p:spPr>
+          <a:xfrm>
+            <a:off x="5449178" y="4343400"/>
+            <a:ext cx="1054978" cy="754855"/>
+          </a:xfrm>
+          <a:prstGeom prst="flowChartMultidocument">
+            <a:avLst/>
+          </a:prstGeom>
+        </p:spPr>
+        <p:style>
+          <a:lnRef idx="2">
+            <a:schemeClr val="dk1"/>
+          </a:lnRef>
+          <a:fillRef idx="1">
+            <a:schemeClr val="lt1"/>
+          </a:fillRef>
+          <a:effectRef idx="0">
+            <a:schemeClr val="dk1"/>
+          </a:effectRef>
+          <a:fontRef idx="minor">
+            <a:schemeClr val="dk1"/>
+          </a:fontRef>
+        </p:style>
+        <p:txBody>
+          <a:bodyPr rtlCol="0" anchor="ctr"/>
+          <a:lstStyle/>
+          <a:p>
+            <a:pPr algn="ctr"/>
+            <a:r>
+              <a:rPr lang="en-US" sz="1000" dirty="0" smtClean="0"/>
+              <a:t>Object2Data_standard.txt</a:t>
+            </a:r>
+            <a:endParaRPr lang="en-US" sz="1000" dirty="0"/>
+          </a:p>
+        </p:txBody>
+      </p:sp>
+      <p:sp>
+        <p:nvSpPr>
+          <p:cNvPr id="24" name="Flowchart: Document 23"/>
+          <p:cNvSpPr/>
+          <p:nvPr/>
+        </p:nvSpPr>
+        <p:spPr>
+          <a:xfrm>
+            <a:off x="5449178" y="5326856"/>
+            <a:ext cx="1054978" cy="754855"/>
+          </a:xfrm>
+          <a:prstGeom prst="flowChartDocument">
+            <a:avLst/>
+          </a:prstGeom>
+        </p:spPr>
+        <p:style>
+          <a:lnRef idx="2">
+            <a:schemeClr val="dk1"/>
+          </a:lnRef>
+          <a:fillRef idx="1">
+            <a:schemeClr val="lt1"/>
+          </a:fillRef>
+          <a:effectRef idx="0">
+            <a:schemeClr val="dk1"/>
+          </a:effectRef>
+          <a:fontRef idx="minor">
+            <a:schemeClr val="dk1"/>
+          </a:fontRef>
+        </p:style>
+        <p:txBody>
+          <a:bodyPr rtlCol="0" anchor="ctr"/>
+          <a:lstStyle/>
+          <a:p>
+            <a:pPr algn="ctr"/>
+            <a:r>
+              <a:rPr lang="en-US" smtClean="0"/>
+              <a:t>Object2_fitInfo.txt</a:t>
+            </a:r>
+            <a:endParaRPr lang="en-US" dirty="0"/>
+          </a:p>
+        </p:txBody>
+      </p:sp>
+      <p:sp>
+        <p:nvSpPr>
+          <p:cNvPr id="12" name="Left Brace 11"/>
+          <p:cNvSpPr/>
+          <p:nvPr/>
+        </p:nvSpPr>
+        <p:spPr>
+          <a:xfrm rot="5400000">
+            <a:off x="3351604" y="-344888"/>
+            <a:ext cx="311944" cy="3271846"/>
+          </a:xfrm>
+          <a:prstGeom prst="leftBrace">
+            <a:avLst/>
+          </a:prstGeom>
+        </p:spPr>
+        <p:style>
+          <a:lnRef idx="1">
+            <a:schemeClr val="accent1"/>
+          </a:lnRef>
+          <a:fillRef idx="0">
+            <a:schemeClr val="accent1"/>
+          </a:fillRef>
+          <a:effectRef idx="0">
+            <a:schemeClr val="accent1"/>
+          </a:effectRef>
+          <a:fontRef idx="minor">
+            <a:schemeClr val="tx1"/>
+          </a:fontRef>
+        </p:style>
+        <p:txBody>
+          <a:bodyPr rtlCol="0" anchor="ctr"/>
+          <a:lstStyle/>
+          <a:p>
+            <a:pPr algn="ctr"/>
+            <a:endParaRPr lang="en-US"/>
+          </a:p>
+        </p:txBody>
+      </p:sp>
+      <p:sp>
+        <p:nvSpPr>
+          <p:cNvPr id="27" name="Left Brace 26"/>
+          <p:cNvSpPr/>
+          <p:nvPr/>
+        </p:nvSpPr>
+        <p:spPr>
+          <a:xfrm rot="5400000">
+            <a:off x="4933946" y="1885946"/>
+            <a:ext cx="345285" cy="1978823"/>
+          </a:xfrm>
+          <a:prstGeom prst="leftBrace">
+            <a:avLst>
+              <a:gd name="adj1" fmla="val 8333"/>
+              <a:gd name="adj2" fmla="val 48716"/>
+            </a:avLst>
+          </a:prstGeom>
+        </p:spPr>
+        <p:style>
+          <a:lnRef idx="1">
+            <a:schemeClr val="accent1"/>
+          </a:lnRef>
+          <a:fillRef idx="0">
+            <a:schemeClr val="accent1"/>
+          </a:fillRef>
+          <a:effectRef idx="0">
+            <a:schemeClr val="accent1"/>
+          </a:effectRef>
+          <a:fontRef idx="minor">
+            <a:schemeClr val="tx1"/>
+          </a:fontRef>
+        </p:style>
+        <p:txBody>
+          <a:bodyPr rtlCol="0" anchor="ctr"/>
+          <a:lstStyle/>
+          <a:p>
+            <a:pPr algn="ctr"/>
+            <a:endParaRPr lang="en-US"/>
+          </a:p>
+        </p:txBody>
+      </p:sp>
+    </p:spTree>
+    <p:extLst>
+      <p:ext uri="{BB962C8B-B14F-4D97-AF65-F5344CB8AC3E}">
+        <p14:creationId xmlns:p14="http://schemas.microsoft.com/office/powerpoint/2010/main" val="1180244357"/>
       </p:ext>
     </p:extLst>
   </p:cSld>

</xml_diff>